<commit_message>
avoid lds bank conflict without padding
</commit_message>
<xml_diff>
--- a/Transpose/doc/tile transpose.pptx
+++ b/Transpose/doc/tile transpose.pptx
@@ -5,18 +5,19 @@
     <p:sldMasterId id="2147483891" r:id="rId3"/>
   </p:sldMasterIdLst>
   <p:notesMasterIdLst>
-    <p:notesMasterId r:id="rId10"/>
+    <p:notesMasterId r:id="rId11"/>
   </p:notesMasterIdLst>
   <p:handoutMasterIdLst>
-    <p:handoutMasterId r:id="rId11"/>
+    <p:handoutMasterId r:id="rId12"/>
   </p:handoutMasterIdLst>
   <p:sldIdLst>
     <p:sldId id="268" r:id="rId4"/>
     <p:sldId id="269" r:id="rId5"/>
     <p:sldId id="270" r:id="rId6"/>
-    <p:sldId id="271" r:id="rId7"/>
-    <p:sldId id="272" r:id="rId8"/>
-    <p:sldId id="273" r:id="rId9"/>
+    <p:sldId id="274" r:id="rId7"/>
+    <p:sldId id="271" r:id="rId8"/>
+    <p:sldId id="272" r:id="rId9"/>
+    <p:sldId id="273" r:id="rId10"/>
   </p:sldIdLst>
   <p:sldSz cx="12188825" cy="6858000"/>
   <p:notesSz cx="6858000" cy="4819650"/>
@@ -153,6 +154,7 @@
             <p14:sldId id="268"/>
             <p14:sldId id="269"/>
             <p14:sldId id="270"/>
+            <p14:sldId id="274"/>
             <p14:sldId id="271"/>
             <p14:sldId id="272"/>
             <p14:sldId id="273"/>
@@ -335,7 +337,7 @@
               <a:pPr>
                 <a:defRPr/>
               </a:pPr>
-              <a:t>9/27/2020</a:t>
+              <a:t>1/8/2021</a:t>
             </a:fld>
             <a:endParaRPr lang="en-US"/>
           </a:p>
@@ -554,7 +556,7 @@
               <a:pPr>
                 <a:defRPr/>
               </a:pPr>
-              <a:t>9/27/2020</a:t>
+              <a:t>1/8/2021</a:t>
             </a:fld>
             <a:endParaRPr lang="en-US"/>
           </a:p>
@@ -2236,7 +2238,7 @@
       </p:pic>
       <p:sp>
         <p:nvSpPr>
-          <p:cNvPr id="4" name="MSIPCMContentMarking" descr="{&quot;HashCode&quot;:1292881367,&quot;Placement&quot;:&quot;Header&quot;,&quot;Top&quot;:0.0,&quot;Left&quot;:0.0,&quot;SlideWidth&quot;:959,&quot;SlideHeight&quot;:540}">
+          <p:cNvPr id="4" name="MSIPCMContentMarking" descr="{&quot;HashCode&quot;:1292964888,&quot;Placement&quot;:&quot;Header&quot;,&quot;Top&quot;:0.0,&quot;Left&quot;:0.0,&quot;SlideWidth&quot;:959,&quot;SlideHeight&quot;:540}">
             <a:extLst>
               <a:ext uri="{FF2B5EF4-FFF2-40B4-BE49-F238E27FC236}">
                 <a16:creationId xmlns:a16="http://schemas.microsoft.com/office/drawing/2014/main" id="{8ACE8477-A880-4BF4-8426-00AED51D5750}"/>
@@ -2249,7 +2251,7 @@
         <p:spPr>
           <a:xfrm>
             <a:off x="0" y="0"/>
-            <a:ext cx="3183013" cy="249198"/>
+            <a:ext cx="3492171" cy="264974"/>
           </a:xfrm>
           <a:prstGeom prst="rect">
             <a:avLst/>
@@ -2276,7 +2278,7 @@
               <a:buChar char="}"/>
             </a:pPr>
             <a:r>
-              <a:rPr lang="en-US" sz="1000">
+              <a:rPr lang="en-US" sz="1100">
                 <a:solidFill>
                   <a:srgbClr val="0078D7"/>
                 </a:solidFill>
@@ -2284,7 +2286,7 @@
               </a:rPr>
               <a:t>[AMD Official Use Only - Internal Distribution Only]</a:t>
             </a:r>
-            <a:endParaRPr lang="en-US" sz="1000" dirty="0">
+            <a:endParaRPr lang="en-US" sz="1100" dirty="0">
               <a:solidFill>
                 <a:srgbClr val="0078D7"/>
               </a:solidFill>
@@ -3284,27 +3286,33 @@
           <a:p>
             <a:r>
               <a:rPr lang="en-US" altLang="zh-CN" dirty="0"/>
-              <a:t>Reduce bank conflict with padding</a:t>
+              <a:t>Reduce bank conflict by overlap patten</a:t>
             </a:r>
           </a:p>
           <a:p>
             <a:pPr lvl="1"/>
             <a:r>
               <a:rPr lang="en-US" altLang="zh-CN" dirty="0"/>
-              <a:t>Increase workgroup number</a:t>
-            </a:r>
-          </a:p>
-          <a:p>
-            <a:pPr lvl="1"/>
+              <a:t>Pad one float every row (float)</a:t>
+            </a:r>
+          </a:p>
+          <a:p>
+            <a:pPr lvl="2"/>
             <a:r>
               <a:rPr lang="en-US" altLang="zh-CN" dirty="0"/>
-              <a:t>Improve only less than 200 </a:t>
-            </a:r>
+              <a:t>SQ_LDS_BANK_CONFLICT (0)</a:t>
+            </a:r>
+          </a:p>
+          <a:p>
+            <a:pPr lvl="2"/>
             <a:r>
               <a:rPr lang="en-US" altLang="zh-CN" dirty="0" err="1"/>
-              <a:t>clk</a:t>
-            </a:r>
-            <a:endParaRPr lang="en-US" altLang="zh-CN" dirty="0"/>
+              <a:t>LDSBankConflict</a:t>
+            </a:r>
+            <a:r>
+              <a:rPr lang="en-US" altLang="zh-CN" dirty="0"/>
+              <a:t> (0%)</a:t>
+            </a:r>
           </a:p>
           <a:p>
             <a:pPr lvl="1"/>
@@ -3317,7 +3325,7 @@
           <p:cNvPr id="6" name="Picture 5">
             <a:extLst>
               <a:ext uri="{FF2B5EF4-FFF2-40B4-BE49-F238E27FC236}">
-                <a16:creationId xmlns:a16="http://schemas.microsoft.com/office/drawing/2014/main" id="{61B26191-8BDE-493D-AF71-9EDFF4B25BDC}"/>
+                <a16:creationId xmlns:a16="http://schemas.microsoft.com/office/drawing/2014/main" id="{0F241932-DD12-4A7B-9FC3-BA4981117C24}"/>
               </a:ext>
             </a:extLst>
           </p:cNvPr>
@@ -3326,15 +3334,16 @@
           </p:cNvPicPr>
           <p:nvPr/>
         </p:nvPicPr>
-        <p:blipFill rotWithShape="1">
+        <p:blipFill>
           <a:blip r:embed="rId2"/>
-          <a:srcRect b="33144"/>
-          <a:stretch/>
+          <a:stretch>
+            <a:fillRect/>
+          </a:stretch>
         </p:blipFill>
         <p:spPr>
           <a:xfrm>
-            <a:off x="194959" y="2796507"/>
-            <a:ext cx="11798906" cy="1600566"/>
+            <a:off x="8508387" y="1722972"/>
+            <a:ext cx="2896213" cy="4096804"/>
           </a:xfrm>
           <a:prstGeom prst="rect">
             <a:avLst/>
@@ -3346,7 +3355,7 @@
           <p:cNvPr id="8" name="Picture 7">
             <a:extLst>
               <a:ext uri="{FF2B5EF4-FFF2-40B4-BE49-F238E27FC236}">
-                <a16:creationId xmlns:a16="http://schemas.microsoft.com/office/drawing/2014/main" id="{082E0D0B-F8C5-4C08-8ED7-2E64CF0F6724}"/>
+                <a16:creationId xmlns:a16="http://schemas.microsoft.com/office/drawing/2014/main" id="{97DA205A-6FE1-448A-A2F9-2B7436D34F20}"/>
               </a:ext>
             </a:extLst>
           </p:cNvPr>
@@ -3355,25 +3364,150 @@
           </p:cNvPicPr>
           <p:nvPr/>
         </p:nvPicPr>
-        <p:blipFill rotWithShape="1">
+        <p:blipFill>
           <a:blip r:embed="rId3"/>
-          <a:srcRect b="31784"/>
-          <a:stretch/>
+          <a:stretch>
+            <a:fillRect/>
+          </a:stretch>
         </p:blipFill>
         <p:spPr>
           <a:xfrm>
-            <a:off x="163207" y="4597338"/>
-            <a:ext cx="11862410" cy="1667792"/>
+            <a:off x="313244" y="3005673"/>
+            <a:ext cx="7680197" cy="2762328"/>
           </a:xfrm>
           <a:prstGeom prst="rect">
             <a:avLst/>
           </a:prstGeom>
         </p:spPr>
       </p:pic>
+      <p:sp>
+        <p:nvSpPr>
+          <p:cNvPr id="9" name="Rectangle 8">
+            <a:extLst>
+              <a:ext uri="{FF2B5EF4-FFF2-40B4-BE49-F238E27FC236}">
+                <a16:creationId xmlns:a16="http://schemas.microsoft.com/office/drawing/2014/main" id="{D66B2C68-7B07-494A-86EE-5D142F61A008}"/>
+              </a:ext>
+            </a:extLst>
+          </p:cNvPr>
+          <p:cNvSpPr/>
+          <p:nvPr/>
+        </p:nvSpPr>
+        <p:spPr>
+          <a:xfrm>
+            <a:off x="3344333" y="5768001"/>
+            <a:ext cx="1752600" cy="541663"/>
+          </a:xfrm>
+          <a:prstGeom prst="rect">
+            <a:avLst/>
+          </a:prstGeom>
+          <a:noFill/>
+          <a:ln>
+            <a:noFill/>
+          </a:ln>
+          <a:effectLst/>
+        </p:spPr>
+        <p:style>
+          <a:lnRef idx="2">
+            <a:schemeClr val="accent1">
+              <a:shade val="50000"/>
+            </a:schemeClr>
+          </a:lnRef>
+          <a:fillRef idx="1">
+            <a:schemeClr val="accent1"/>
+          </a:fillRef>
+          <a:effectRef idx="0">
+            <a:schemeClr val="accent1"/>
+          </a:effectRef>
+          <a:fontRef idx="minor">
+            <a:schemeClr val="lt1"/>
+          </a:fontRef>
+        </p:style>
+        <p:txBody>
+          <a:bodyPr rtlCol="0" anchor="ctr"/>
+          <a:lstStyle/>
+          <a:p>
+            <a:pPr algn="ctr"/>
+            <a:r>
+              <a:rPr lang="en-US" dirty="0" err="1">
+                <a:solidFill>
+                  <a:schemeClr val="bg1"/>
+                </a:solidFill>
+              </a:rPr>
+              <a:t>Lds</a:t>
+            </a:r>
+            <a:r>
+              <a:rPr lang="en-US" dirty="0">
+                <a:solidFill>
+                  <a:schemeClr val="bg1"/>
+                </a:solidFill>
+              </a:rPr>
+              <a:t> write</a:t>
+            </a:r>
+          </a:p>
+        </p:txBody>
+      </p:sp>
+      <p:sp>
+        <p:nvSpPr>
+          <p:cNvPr id="11" name="Rectangle 10">
+            <a:extLst>
+              <a:ext uri="{FF2B5EF4-FFF2-40B4-BE49-F238E27FC236}">
+                <a16:creationId xmlns:a16="http://schemas.microsoft.com/office/drawing/2014/main" id="{657F33FF-FFC9-4540-9041-B24DA7613757}"/>
+              </a:ext>
+            </a:extLst>
+          </p:cNvPr>
+          <p:cNvSpPr/>
+          <p:nvPr/>
+        </p:nvSpPr>
+        <p:spPr>
+          <a:xfrm>
+            <a:off x="9304867" y="5723467"/>
+            <a:ext cx="1752600" cy="541663"/>
+          </a:xfrm>
+          <a:prstGeom prst="rect">
+            <a:avLst/>
+          </a:prstGeom>
+          <a:noFill/>
+          <a:ln>
+            <a:noFill/>
+          </a:ln>
+          <a:effectLst/>
+        </p:spPr>
+        <p:style>
+          <a:lnRef idx="2">
+            <a:schemeClr val="accent1">
+              <a:shade val="50000"/>
+            </a:schemeClr>
+          </a:lnRef>
+          <a:fillRef idx="1">
+            <a:schemeClr val="accent1"/>
+          </a:fillRef>
+          <a:effectRef idx="0">
+            <a:schemeClr val="accent1"/>
+          </a:effectRef>
+          <a:fontRef idx="minor">
+            <a:schemeClr val="lt1"/>
+          </a:fontRef>
+        </p:style>
+        <p:txBody>
+          <a:bodyPr rtlCol="0" anchor="ctr"/>
+          <a:lstStyle/>
+          <a:p>
+            <a:pPr algn="ctr"/>
+            <a:r>
+              <a:rPr lang="en-US" dirty="0">
+                <a:solidFill>
+                  <a:schemeClr val="bg1"/>
+                </a:solidFill>
+              </a:rPr>
+              <a:t>Global read</a:t>
+            </a:r>
+          </a:p>
+        </p:txBody>
+      </p:sp>
     </p:spTree>
     <p:extLst>
       <p:ext uri="{BB962C8B-B14F-4D97-AF65-F5344CB8AC3E}">
-        <p14:creationId xmlns:p14="http://schemas.microsoft.com/office/powerpoint/2010/main" val="2066833597"/>
+        <p14:creationId xmlns:p14="http://schemas.microsoft.com/office/powerpoint/2010/main" val="4262286899"/>
       </p:ext>
     </p:extLst>
   </p:cSld>
@@ -3486,6 +3620,208 @@
           <a:p>
             <a:r>
               <a:rPr lang="en-US" altLang="zh-CN" dirty="0"/>
+              <a:t>Reduce bank conflict with padding</a:t>
+            </a:r>
+          </a:p>
+          <a:p>
+            <a:pPr lvl="1"/>
+            <a:r>
+              <a:rPr lang="en-US" altLang="zh-CN" dirty="0"/>
+              <a:t>Increase workgroup number</a:t>
+            </a:r>
+          </a:p>
+          <a:p>
+            <a:pPr lvl="1"/>
+            <a:r>
+              <a:rPr lang="en-US" altLang="zh-CN" dirty="0"/>
+              <a:t>Improve only less than 200 </a:t>
+            </a:r>
+            <a:r>
+              <a:rPr lang="en-US" altLang="zh-CN" dirty="0" err="1"/>
+              <a:t>clk</a:t>
+            </a:r>
+            <a:endParaRPr lang="en-US" altLang="zh-CN" dirty="0"/>
+          </a:p>
+          <a:p>
+            <a:pPr lvl="1"/>
+            <a:endParaRPr lang="en-US" dirty="0"/>
+          </a:p>
+        </p:txBody>
+      </p:sp>
+      <p:pic>
+        <p:nvPicPr>
+          <p:cNvPr id="6" name="Picture 5">
+            <a:extLst>
+              <a:ext uri="{FF2B5EF4-FFF2-40B4-BE49-F238E27FC236}">
+                <a16:creationId xmlns:a16="http://schemas.microsoft.com/office/drawing/2014/main" id="{61B26191-8BDE-493D-AF71-9EDFF4B25BDC}"/>
+              </a:ext>
+            </a:extLst>
+          </p:cNvPr>
+          <p:cNvPicPr>
+            <a:picLocks noChangeAspect="1"/>
+          </p:cNvPicPr>
+          <p:nvPr/>
+        </p:nvPicPr>
+        <p:blipFill rotWithShape="1">
+          <a:blip r:embed="rId2"/>
+          <a:srcRect b="33144"/>
+          <a:stretch/>
+        </p:blipFill>
+        <p:spPr>
+          <a:xfrm>
+            <a:off x="194959" y="2796507"/>
+            <a:ext cx="11798906" cy="1600566"/>
+          </a:xfrm>
+          <a:prstGeom prst="rect">
+            <a:avLst/>
+          </a:prstGeom>
+        </p:spPr>
+      </p:pic>
+      <p:pic>
+        <p:nvPicPr>
+          <p:cNvPr id="8" name="Picture 7">
+            <a:extLst>
+              <a:ext uri="{FF2B5EF4-FFF2-40B4-BE49-F238E27FC236}">
+                <a16:creationId xmlns:a16="http://schemas.microsoft.com/office/drawing/2014/main" id="{082E0D0B-F8C5-4C08-8ED7-2E64CF0F6724}"/>
+              </a:ext>
+            </a:extLst>
+          </p:cNvPr>
+          <p:cNvPicPr>
+            <a:picLocks noChangeAspect="1"/>
+          </p:cNvPicPr>
+          <p:nvPr/>
+        </p:nvPicPr>
+        <p:blipFill rotWithShape="1">
+          <a:blip r:embed="rId3"/>
+          <a:srcRect b="31784"/>
+          <a:stretch/>
+        </p:blipFill>
+        <p:spPr>
+          <a:xfrm>
+            <a:off x="163207" y="4597338"/>
+            <a:ext cx="11862410" cy="1667792"/>
+          </a:xfrm>
+          <a:prstGeom prst="rect">
+            <a:avLst/>
+          </a:prstGeom>
+        </p:spPr>
+      </p:pic>
+    </p:spTree>
+    <p:extLst>
+      <p:ext uri="{BB962C8B-B14F-4D97-AF65-F5344CB8AC3E}">
+        <p14:creationId xmlns:p14="http://schemas.microsoft.com/office/powerpoint/2010/main" val="2066833597"/>
+      </p:ext>
+    </p:extLst>
+  </p:cSld>
+  <p:clrMapOvr>
+    <a:masterClrMapping/>
+  </p:clrMapOvr>
+</p:sld>
+</file>
+
+<file path=ppt/slides/slide6.xml><?xml version="1.0" encoding="utf-8"?>
+<p:sld xmlns:a="http://schemas.openxmlformats.org/drawingml/2006/main" xmlns:r="http://schemas.openxmlformats.org/officeDocument/2006/relationships" xmlns:p="http://schemas.openxmlformats.org/presentationml/2006/main">
+  <p:cSld>
+    <p:spTree>
+      <p:nvGrpSpPr>
+        <p:cNvPr id="1" name=""/>
+        <p:cNvGrpSpPr/>
+        <p:nvPr/>
+      </p:nvGrpSpPr>
+      <p:grpSpPr>
+        <a:xfrm>
+          <a:off x="0" y="0"/>
+          <a:ext cx="0" cy="0"/>
+          <a:chOff x="0" y="0"/>
+          <a:chExt cx="0" cy="0"/>
+        </a:xfrm>
+      </p:grpSpPr>
+      <p:sp>
+        <p:nvSpPr>
+          <p:cNvPr id="3" name="Title 2">
+            <a:extLst>
+              <a:ext uri="{FF2B5EF4-FFF2-40B4-BE49-F238E27FC236}">
+                <a16:creationId xmlns:a16="http://schemas.microsoft.com/office/drawing/2014/main" id="{29011275-D0D1-41F9-A461-8C37008856D3}"/>
+              </a:ext>
+            </a:extLst>
+          </p:cNvPr>
+          <p:cNvSpPr>
+            <a:spLocks noGrp="1"/>
+          </p:cNvSpPr>
+          <p:nvPr>
+            <p:ph type="title"/>
+          </p:nvPr>
+        </p:nvSpPr>
+        <p:spPr/>
+        <p:txBody>
+          <a:bodyPr/>
+          <a:lstStyle/>
+          <a:p>
+            <a:r>
+              <a:rPr lang="en-US" altLang="zh-CN" dirty="0"/>
+              <a:t>transpose</a:t>
+            </a:r>
+            <a:endParaRPr lang="en-US" dirty="0"/>
+          </a:p>
+        </p:txBody>
+      </p:sp>
+      <p:sp>
+        <p:nvSpPr>
+          <p:cNvPr id="4" name="Text Placeholder 3">
+            <a:extLst>
+              <a:ext uri="{FF2B5EF4-FFF2-40B4-BE49-F238E27FC236}">
+                <a16:creationId xmlns:a16="http://schemas.microsoft.com/office/drawing/2014/main" id="{FB6BA1FA-6D7D-4A24-B2AB-602E260B40BF}"/>
+              </a:ext>
+            </a:extLst>
+          </p:cNvPr>
+          <p:cNvSpPr>
+            <a:spLocks noGrp="1"/>
+          </p:cNvSpPr>
+          <p:nvPr>
+            <p:ph type="body" sz="quarter" idx="10"/>
+          </p:nvPr>
+        </p:nvSpPr>
+        <p:spPr/>
+        <p:txBody>
+          <a:bodyPr/>
+          <a:lstStyle/>
+          <a:p>
+            <a:r>
+              <a:rPr lang="en-US" altLang="zh-CN" dirty="0"/>
+              <a:t>transpose</a:t>
+            </a:r>
+            <a:endParaRPr lang="en-US" dirty="0"/>
+          </a:p>
+        </p:txBody>
+      </p:sp>
+      <p:sp>
+        <p:nvSpPr>
+          <p:cNvPr id="5" name="Content Placeholder 4">
+            <a:extLst>
+              <a:ext uri="{FF2B5EF4-FFF2-40B4-BE49-F238E27FC236}">
+                <a16:creationId xmlns:a16="http://schemas.microsoft.com/office/drawing/2014/main" id="{AA86CAFA-C58A-4769-AC7D-96B855ACAD6F}"/>
+              </a:ext>
+            </a:extLst>
+          </p:cNvPr>
+          <p:cNvSpPr>
+            <a:spLocks noGrp="1"/>
+          </p:cNvSpPr>
+          <p:nvPr>
+            <p:ph idx="1"/>
+          </p:nvPr>
+        </p:nvSpPr>
+        <p:spPr>
+          <a:xfrm>
+            <a:off x="313245" y="1038224"/>
+            <a:ext cx="11338560" cy="4941157"/>
+          </a:xfrm>
+        </p:spPr>
+        <p:txBody>
+          <a:bodyPr/>
+          <a:lstStyle/>
+          <a:p>
+            <a:r>
+              <a:rPr lang="en-US" altLang="zh-CN" dirty="0"/>
               <a:t>Reduce instruction</a:t>
             </a:r>
           </a:p>
@@ -3568,7 +3904,7 @@
 </p:sld>
 </file>
 
-<file path=ppt/slides/slide6.xml><?xml version="1.0" encoding="utf-8"?>
+<file path=ppt/slides/slide7.xml><?xml version="1.0" encoding="utf-8"?>
 <p:sld xmlns:a="http://schemas.openxmlformats.org/drawingml/2006/main" xmlns:r="http://schemas.openxmlformats.org/officeDocument/2006/relationships" xmlns:p="http://schemas.openxmlformats.org/presentationml/2006/main">
   <p:cSld>
     <p:spTree>
@@ -4739,6 +5075,15 @@
 </file>
 
 <file path=customXml/item1.xml><?xml version="1.0" encoding="utf-8"?>
+<?mso-contentType ?>
+<FormTemplates xmlns="http://schemas.microsoft.com/sharepoint/v3/contenttype/forms">
+  <Display>DocumentLibraryForm</Display>
+  <Edit>DocumentLibraryForm</Edit>
+  <New>DocumentLibraryForm</New>
+</FormTemplates>
+</file>
+
+<file path=customXml/item2.xml><?xml version="1.0" encoding="utf-8"?>
 <ct:contentTypeSchema xmlns:ct="http://schemas.microsoft.com/office/2006/metadata/contentType" xmlns:ma="http://schemas.microsoft.com/office/2006/metadata/properties/metaAttributes" ct:_="" ma:_="" ma:contentTypeName="Document" ma:contentTypeID="0x010100B040F28C9190714F9051F1661A72B344" ma:contentTypeVersion="0" ma:contentTypeDescription="Create a new document." ma:contentTypeScope="" ma:versionID="b8b95d69f10381dae1e3fc8aa097d9b2">
   <xsd:schema xmlns:xsd="http://www.w3.org/2001/XMLSchema" xmlns:xs="http://www.w3.org/2001/XMLSchema" xmlns:p="http://schemas.microsoft.com/office/2006/metadata/properties" targetNamespace="http://schemas.microsoft.com/office/2006/metadata/properties" ma:root="true" ma:fieldsID="1b05d82d297216baf5b26c55225140df">
     <xsd:element name="properties">
@@ -4852,16 +5197,15 @@
 </ct:contentTypeSchema>
 </file>
 
-<file path=customXml/item2.xml><?xml version="1.0" encoding="utf-8"?>
-<?mso-contentType ?>
-<FormTemplates xmlns="http://schemas.microsoft.com/sharepoint/v3/contenttype/forms">
-  <Display>DocumentLibraryForm</Display>
-  <Edit>DocumentLibraryForm</Edit>
-  <New>DocumentLibraryForm</New>
-</FormTemplates>
+<file path=customXml/itemProps1.xml><?xml version="1.0" encoding="utf-8"?>
+<ds:datastoreItem xmlns:ds="http://schemas.openxmlformats.org/officeDocument/2006/customXml" ds:itemID="{46C7C7BA-398C-443C-9325-A8C61CE3C0A0}">
+  <ds:schemaRefs>
+    <ds:schemaRef ds:uri="http://schemas.microsoft.com/sharepoint/v3/contenttype/forms"/>
+  </ds:schemaRefs>
+</ds:datastoreItem>
 </file>
 
-<file path=customXml/itemProps1.xml><?xml version="1.0" encoding="utf-8"?>
+<file path=customXml/itemProps2.xml><?xml version="1.0" encoding="utf-8"?>
 <ds:datastoreItem xmlns:ds="http://schemas.openxmlformats.org/officeDocument/2006/customXml" ds:itemID="{CB9B9DAE-0203-490A-8CF8-6A331C5A0B02}">
   <ds:schemaRefs>
     <ds:schemaRef ds:uri="http://schemas.microsoft.com/office/2006/metadata/contentType"/>
@@ -4875,12 +5219,4 @@
     <ds:schemaRef ds:uri="http://schemas.microsoft.com/office/infopath/2007/PartnerControls"/>
   </ds:schemaRefs>
 </ds:datastoreItem>
-</file>
-
-<file path=customXml/itemProps2.xml><?xml version="1.0" encoding="utf-8"?>
-<ds:datastoreItem xmlns:ds="http://schemas.openxmlformats.org/officeDocument/2006/customXml" ds:itemID="{46C7C7BA-398C-443C-9325-A8C61CE3C0A0}">
-  <ds:schemaRefs>
-    <ds:schemaRef ds:uri="http://schemas.microsoft.com/sharepoint/v3/contenttype/forms"/>
-  </ds:schemaRefs>
-</ds:datastoreItem>
 </file>
</xml_diff>